<commit_message>
apresentação final video slides
</commit_message>
<xml_diff>
--- a/docs/Projeto Goodluck.pptx
+++ b/docs/Projeto Goodluck.pptx
@@ -47,7 +47,7 @@
         <p:txBody>
           <a:bodyPr/>
           <a:p>
-            <a:fld id="{C8A9EFD6-3679-4E80-9489-17F4111DBF2C}" type="slidenum">
+            <a:fld id="{73FCDDFA-69E6-44B6-84D6-BAF231FDF06E}" type="slidenum">
               <a:t>&lt;#&gt;</a:t>
             </a:fld>
           </a:p>
@@ -194,7 +194,7 @@
         <p:txBody>
           <a:bodyPr/>
           <a:p>
-            <a:fld id="{32C206BE-3C77-466B-87F1-32C03F650A83}" type="slidenum">
+            <a:fld id="{A2C97F75-422C-4FB4-914D-0C5F54A4CB70}" type="slidenum">
               <a:t>&lt;#&gt;</a:t>
             </a:fld>
           </a:p>
@@ -409,7 +409,7 @@
         <p:txBody>
           <a:bodyPr/>
           <a:p>
-            <a:fld id="{0791F90C-1656-4292-AE34-9E98C840AAB6}" type="slidenum">
+            <a:fld id="{6983FAA8-D2F0-4CD5-AA91-23DD8251B07A}" type="slidenum">
               <a:t>&lt;#&gt;</a:t>
             </a:fld>
           </a:p>
@@ -692,7 +692,7 @@
         <p:txBody>
           <a:bodyPr/>
           <a:p>
-            <a:fld id="{141A0B56-A29D-45F0-86E2-EE55397650FB}" type="slidenum">
+            <a:fld id="{DD120563-17C7-4197-8CC7-FE0AF24C4480}" type="slidenum">
               <a:t>&lt;#&gt;</a:t>
             </a:fld>
           </a:p>
@@ -734,7 +734,7 @@
         <p:txBody>
           <a:bodyPr/>
           <a:p>
-            <a:fld id="{AC293DFF-2DF8-4194-A46B-88CE9FE4A98E}" type="slidenum">
+            <a:fld id="{9DE91BD7-E600-469B-8B85-13CF9085CF1A}" type="slidenum">
               <a:t>&lt;#&gt;</a:t>
             </a:fld>
           </a:p>
@@ -850,7 +850,7 @@
         <p:txBody>
           <a:bodyPr/>
           <a:p>
-            <a:fld id="{B40F3ADA-BA9F-44E0-B3FF-D3F60430CDC1}" type="slidenum">
+            <a:fld id="{0D48FC8C-4716-4846-9472-66B0492DC5C1}" type="slidenum">
               <a:t>&lt;#&gt;</a:t>
             </a:fld>
           </a:p>
@@ -963,7 +963,7 @@
         <p:txBody>
           <a:bodyPr/>
           <a:p>
-            <a:fld id="{3803A6C1-913E-4EC5-BA56-3450D84E580D}" type="slidenum">
+            <a:fld id="{9D3ACBD9-2EB0-4493-AE8A-2C3DA2B2CDB2}" type="slidenum">
               <a:t>&lt;#&gt;</a:t>
             </a:fld>
           </a:p>
@@ -1110,7 +1110,7 @@
         <p:txBody>
           <a:bodyPr/>
           <a:p>
-            <a:fld id="{0306CB45-0C27-4474-8B0D-3D44F6EDBE77}" type="slidenum">
+            <a:fld id="{75865B6F-ADC7-4FCF-86B5-A5FECAB3FAC3}" type="slidenum">
               <a:t>&lt;#&gt;</a:t>
             </a:fld>
           </a:p>
@@ -1189,7 +1189,7 @@
         <p:txBody>
           <a:bodyPr/>
           <a:p>
-            <a:fld id="{10C299B4-5F43-49A7-8041-5141874C0EF7}" type="slidenum">
+            <a:fld id="{B993FCDE-B70D-445B-B46E-8CD20850227F}" type="slidenum">
               <a:t>&lt;#&gt;</a:t>
             </a:fld>
           </a:p>
@@ -1268,7 +1268,7 @@
         <p:txBody>
           <a:bodyPr/>
           <a:p>
-            <a:fld id="{01108FFB-8A0A-475C-9053-8972ADD70B49}" type="slidenum">
+            <a:fld id="{8AD57CC5-B904-4B4B-BD19-EDAC8E0B80DA}" type="slidenum">
               <a:t>&lt;#&gt;</a:t>
             </a:fld>
           </a:p>
@@ -1449,7 +1449,7 @@
         <p:txBody>
           <a:bodyPr/>
           <a:p>
-            <a:fld id="{884CE453-1DFC-4809-851A-F6BE505E0648}" type="slidenum">
+            <a:fld id="{4B8C01A5-0317-4995-A1E8-425A5717C693}" type="slidenum">
               <a:t>&lt;#&gt;</a:t>
             </a:fld>
           </a:p>
@@ -1565,7 +1565,7 @@
         <p:txBody>
           <a:bodyPr/>
           <a:p>
-            <a:fld id="{1FD4A1FF-89CD-4F83-AF43-AC37D1AEEC54}" type="slidenum">
+            <a:fld id="{90AA6629-F3CB-42ED-AFDE-AA54DDEDBA2B}" type="slidenum">
               <a:t>&lt;#&gt;</a:t>
             </a:fld>
           </a:p>
@@ -1746,7 +1746,7 @@
         <p:txBody>
           <a:bodyPr/>
           <a:p>
-            <a:fld id="{6E84D99C-9B7A-4A67-98A1-46F15F7955BA}" type="slidenum">
+            <a:fld id="{C77FD8D5-0FC7-4A29-B465-949C6873324C}" type="slidenum">
               <a:t>&lt;#&gt;</a:t>
             </a:fld>
           </a:p>
@@ -1927,7 +1927,7 @@
         <p:txBody>
           <a:bodyPr/>
           <a:p>
-            <a:fld id="{6F1AA227-C8F2-4E0F-B28B-3B730EFD9D81}" type="slidenum">
+            <a:fld id="{33A407E5-9549-4A4F-8235-45C3CBA6E211}" type="slidenum">
               <a:t>&lt;#&gt;</a:t>
             </a:fld>
           </a:p>
@@ -2074,7 +2074,7 @@
         <p:txBody>
           <a:bodyPr/>
           <a:p>
-            <a:fld id="{8DDE50C4-20A8-4E53-A6E1-B83E2A159201}" type="slidenum">
+            <a:fld id="{9D8EA22E-BDFF-4C0D-B8C9-826DDF6C1B37}" type="slidenum">
               <a:t>&lt;#&gt;</a:t>
             </a:fld>
           </a:p>
@@ -2289,7 +2289,7 @@
         <p:txBody>
           <a:bodyPr/>
           <a:p>
-            <a:fld id="{80BCC5D6-1002-4473-892E-88FFDAE2D533}" type="slidenum">
+            <a:fld id="{4C940604-6166-4FC3-876D-45D3BEA0718A}" type="slidenum">
               <a:t>&lt;#&gt;</a:t>
             </a:fld>
           </a:p>
@@ -2572,7 +2572,7 @@
         <p:txBody>
           <a:bodyPr/>
           <a:p>
-            <a:fld id="{FDD48E9E-64A7-4D35-B2EF-1DA0CE943061}" type="slidenum">
+            <a:fld id="{24A2DCEB-59FE-4F97-B4FD-2BC66490CA01}" type="slidenum">
               <a:t>&lt;#&gt;</a:t>
             </a:fld>
           </a:p>
@@ -2685,7 +2685,7 @@
         <p:txBody>
           <a:bodyPr/>
           <a:p>
-            <a:fld id="{D46AF855-EAFE-4C27-99C9-B090ADD958DE}" type="slidenum">
+            <a:fld id="{67291B0C-031A-4E1F-A7C4-AAA9C7DA914D}" type="slidenum">
               <a:t>&lt;#&gt;</a:t>
             </a:fld>
           </a:p>
@@ -2832,7 +2832,7 @@
         <p:txBody>
           <a:bodyPr/>
           <a:p>
-            <a:fld id="{E49BFD65-6775-43C0-AB4A-A8A9C85E39F4}" type="slidenum">
+            <a:fld id="{EAA93FAF-AFDA-462F-B049-4CBA6F8C316F}" type="slidenum">
               <a:t>&lt;#&gt;</a:t>
             </a:fld>
           </a:p>
@@ -2911,7 +2911,7 @@
         <p:txBody>
           <a:bodyPr/>
           <a:p>
-            <a:fld id="{B0673D04-E59B-4FF5-A1C9-24383A90ADAA}" type="slidenum">
+            <a:fld id="{34EB9FEC-B065-4BE7-A5F8-295BDDD515BA}" type="slidenum">
               <a:t>&lt;#&gt;</a:t>
             </a:fld>
           </a:p>
@@ -2990,7 +2990,7 @@
         <p:txBody>
           <a:bodyPr/>
           <a:p>
-            <a:fld id="{62D94DF0-09FD-487E-880F-0C9767219B56}" type="slidenum">
+            <a:fld id="{6F7C4CD9-79F8-4897-9F5C-EBB37CCFF593}" type="slidenum">
               <a:t>&lt;#&gt;</a:t>
             </a:fld>
           </a:p>
@@ -3171,7 +3171,7 @@
         <p:txBody>
           <a:bodyPr/>
           <a:p>
-            <a:fld id="{DEE9C97E-93C2-4359-A9E1-2E514F8F2624}" type="slidenum">
+            <a:fld id="{CA022452-B203-4000-A0FE-EC49AFF80AA6}" type="slidenum">
               <a:t>&lt;#&gt;</a:t>
             </a:fld>
           </a:p>
@@ -3352,7 +3352,7 @@
         <p:txBody>
           <a:bodyPr/>
           <a:p>
-            <a:fld id="{64A1D434-2DA0-4889-BFA3-0DBB3D1500EF}" type="slidenum">
+            <a:fld id="{0DC21496-7608-4B67-9407-06E258BA9B40}" type="slidenum">
               <a:t>&lt;#&gt;</a:t>
             </a:fld>
           </a:p>
@@ -3533,7 +3533,7 @@
         <p:txBody>
           <a:bodyPr/>
           <a:p>
-            <a:fld id="{9C0812C5-0DA8-4B14-B8DF-F13981E4E458}" type="slidenum">
+            <a:fld id="{AF9E8810-BDA3-4747-8BFB-2880303A2193}" type="slidenum">
               <a:t>&lt;#&gt;</a:t>
             </a:fld>
           </a:p>
@@ -3577,7 +3577,7 @@
         <p:spPr>
           <a:xfrm>
             <a:off x="7007760" y="3177000"/>
-            <a:ext cx="560160" cy="360"/>
+            <a:ext cx="559800" cy="360"/>
           </a:xfrm>
           <a:custGeom>
             <a:avLst/>
@@ -3619,7 +3619,7 @@
         <p:spPr>
           <a:xfrm>
             <a:off x="1575000" y="3158280"/>
-            <a:ext cx="560160" cy="360"/>
+            <a:ext cx="559800" cy="360"/>
           </a:xfrm>
           <a:custGeom>
             <a:avLst/>
@@ -3660,10 +3660,10 @@
         </p:nvGrpSpPr>
         <p:grpSpPr>
           <a:xfrm>
-            <a:off x="1006200" y="1019880"/>
-            <a:ext cx="7134480" cy="152640"/>
-            <a:chOff x="1006200" y="1019880"/>
-            <a:chExt cx="7134480" cy="152640"/>
+            <a:off x="1006560" y="1019520"/>
+            <a:ext cx="7134120" cy="152640"/>
+            <a:chOff x="1006560" y="1019520"/>
+            <a:chExt cx="7134120" cy="152640"/>
           </a:xfrm>
         </p:grpSpPr>
         <p:sp>
@@ -3674,8 +3674,8 @@
           </p:nvSpPr>
           <p:spPr>
             <a:xfrm rot="10800000">
-              <a:off x="1006200" y="1019520"/>
-              <a:ext cx="7134480" cy="360"/>
+              <a:off x="1006560" y="1019160"/>
+              <a:ext cx="7134120" cy="360"/>
             </a:xfrm>
             <a:custGeom>
               <a:avLst/>
@@ -3716,8 +3716,8 @@
           </p:nvSpPr>
           <p:spPr>
             <a:xfrm rot="10800000">
-              <a:off x="1006200" y="1171800"/>
-              <a:ext cx="7134480" cy="360"/>
+              <a:off x="1006560" y="1171440"/>
+              <a:ext cx="7134120" cy="360"/>
             </a:xfrm>
             <a:custGeom>
               <a:avLst/>
@@ -3760,9 +3760,9 @@
         <p:grpSpPr>
           <a:xfrm>
             <a:off x="1004040" y="3969000"/>
-            <a:ext cx="7134480" cy="153000"/>
+            <a:ext cx="7134120" cy="153000"/>
             <a:chOff x="1004040" y="3969000"/>
-            <a:chExt cx="7134480" cy="153000"/>
+            <a:chExt cx="7134120" cy="153000"/>
           </a:xfrm>
         </p:grpSpPr>
         <p:sp>
@@ -3774,7 +3774,7 @@
           <p:spPr>
             <a:xfrm>
               <a:off x="1004040" y="4121640"/>
-              <a:ext cx="7134480" cy="360"/>
+              <a:ext cx="7134120" cy="360"/>
             </a:xfrm>
             <a:custGeom>
               <a:avLst/>
@@ -3816,7 +3816,7 @@
           <p:spPr>
             <a:xfrm>
               <a:off x="1004040" y="3969000"/>
-              <a:ext cx="7134480" cy="360"/>
+              <a:ext cx="7134120" cy="360"/>
             </a:xfrm>
             <a:custGeom>
               <a:avLst/>
@@ -3863,7 +3863,7 @@
         <p:spPr>
           <a:xfrm>
             <a:off x="8472600" y="4663080"/>
-            <a:ext cx="546480" cy="391320"/>
+            <a:ext cx="546120" cy="390960"/>
           </a:xfrm>
           <a:prstGeom prst="rect">
             <a:avLst/>
@@ -3905,7 +3905,7 @@
                 <a:tab algn="l" pos="0"/>
               </a:tabLst>
             </a:pPr>
-            <a:fld id="{A8957A67-F77A-4B33-8FD5-D829FA5A980E}" type="slidenum">
+            <a:fld id="{BDC96FE9-ADD5-4B44-955F-B95F9652CAA6}" type="slidenum">
               <a:rPr b="0" lang="pt-BR" sz="1000" spc="-1" strike="noStrike">
                 <a:solidFill>
                   <a:srgbClr val="695d46"/>
@@ -3913,7 +3913,7 @@
                 <a:latin typeface="Open Sans"/>
                 <a:ea typeface="Open Sans"/>
               </a:rPr>
-              <a:t>&lt;número&gt;</a:t>
+              <a:t>4</a:t>
             </a:fld>
             <a:endParaRPr b="0" lang="pt-BR" sz="1000" spc="-1" strike="noStrike">
               <a:latin typeface="Times New Roman"/>
@@ -4200,7 +4200,7 @@
         <p:spPr>
           <a:xfrm>
             <a:off x="0" y="5045760"/>
-            <a:ext cx="9141840" cy="95760"/>
+            <a:ext cx="9141480" cy="95400"/>
           </a:xfrm>
           <a:prstGeom prst="rect">
             <a:avLst/>
@@ -4232,7 +4232,7 @@
         <p:spPr>
           <a:xfrm>
             <a:off x="8472600" y="4663080"/>
-            <a:ext cx="546480" cy="391320"/>
+            <a:ext cx="546120" cy="390960"/>
           </a:xfrm>
           <a:prstGeom prst="rect">
             <a:avLst/>
@@ -4274,7 +4274,7 @@
                 <a:tab algn="l" pos="0"/>
               </a:tabLst>
             </a:pPr>
-            <a:fld id="{47A54E06-C428-4A2A-8AD3-28E38914D4B8}" type="slidenum">
+            <a:fld id="{4F929ED9-CA70-44E6-893A-13AED624A530}" type="slidenum">
               <a:rPr b="0" lang="pt-BR" sz="1000" spc="-1" strike="noStrike">
                 <a:solidFill>
                   <a:srgbClr val="695d46"/>
@@ -4566,7 +4566,7 @@
         <p:spPr>
           <a:xfrm>
             <a:off x="1004040" y="1282320"/>
-            <a:ext cx="7134480" cy="1020240"/>
+            <a:ext cx="7134120" cy="1019880"/>
           </a:xfrm>
           <a:prstGeom prst="rect">
             <a:avLst/>
@@ -4632,7 +4632,7 @@
         <p:spPr>
           <a:xfrm>
             <a:off x="2137320" y="2850120"/>
-            <a:ext cx="4868280" cy="790560"/>
+            <a:ext cx="4867920" cy="790200"/>
           </a:xfrm>
           <a:prstGeom prst="rect">
             <a:avLst/>
@@ -4681,7 +4681,7 @@
         <p:spPr>
           <a:xfrm>
             <a:off x="2027520" y="4437720"/>
-            <a:ext cx="5171040" cy="600840"/>
+            <a:ext cx="5170680" cy="600480"/>
           </a:xfrm>
           <a:prstGeom prst="rect">
             <a:avLst/>
@@ -4733,7 +4733,7 @@
         <p:spPr>
           <a:xfrm>
             <a:off x="1440000" y="2340000"/>
-            <a:ext cx="6298560" cy="790560"/>
+            <a:ext cx="6298200" cy="790200"/>
           </a:xfrm>
           <a:prstGeom prst="rect">
             <a:avLst/>
@@ -4792,7 +4792,7 @@
         <p:spPr>
           <a:xfrm>
             <a:off x="3780000" y="0"/>
-            <a:ext cx="1439280" cy="1439280"/>
+            <a:ext cx="1438920" cy="1438920"/>
           </a:xfrm>
           <a:prstGeom prst="rect">
             <a:avLst/>
@@ -4845,7 +4845,7 @@
         <p:spPr>
           <a:xfrm>
             <a:off x="311760" y="112320"/>
-            <a:ext cx="2326680" cy="705240"/>
+            <a:ext cx="2326320" cy="704880"/>
           </a:xfrm>
           <a:prstGeom prst="rect">
             <a:avLst/>
@@ -4898,7 +4898,7 @@
         <p:spPr>
           <a:xfrm>
             <a:off x="240120" y="720000"/>
-            <a:ext cx="4798080" cy="4264560"/>
+            <a:ext cx="4797720" cy="4264200"/>
           </a:xfrm>
           <a:prstGeom prst="rect">
             <a:avLst/>
@@ -4954,7 +4954,7 @@
         <p:spPr>
           <a:xfrm>
             <a:off x="5580000" y="900000"/>
-            <a:ext cx="3276000" cy="3276000"/>
+            <a:ext cx="3275640" cy="3275640"/>
           </a:xfrm>
           <a:prstGeom prst="rect">
             <a:avLst/>
@@ -5003,7 +5003,7 @@
         <p:spPr>
           <a:xfrm>
             <a:off x="246960" y="180000"/>
-            <a:ext cx="2326680" cy="705240"/>
+            <a:ext cx="2326320" cy="704880"/>
           </a:xfrm>
           <a:prstGeom prst="rect">
             <a:avLst/>
@@ -5058,7 +5058,7 @@
         <p:spPr>
           <a:xfrm>
             <a:off x="468000" y="886320"/>
-            <a:ext cx="8098200" cy="2270520"/>
+            <a:ext cx="8097840" cy="2270160"/>
           </a:xfrm>
           <a:prstGeom prst="rect">
             <a:avLst/>
@@ -5132,7 +5132,7 @@
         <p:spPr>
           <a:xfrm>
             <a:off x="835200" y="2700000"/>
-            <a:ext cx="7264440" cy="2339280"/>
+            <a:ext cx="7264080" cy="2338920"/>
           </a:xfrm>
           <a:prstGeom prst="rect">
             <a:avLst/>
@@ -5185,7 +5185,7 @@
         <p:spPr>
           <a:xfrm>
             <a:off x="246960" y="180000"/>
-            <a:ext cx="2326680" cy="705240"/>
+            <a:ext cx="2326320" cy="704880"/>
           </a:xfrm>
           <a:prstGeom prst="rect">
             <a:avLst/>
@@ -5238,7 +5238,7 @@
         <p:spPr>
           <a:xfrm>
             <a:off x="540000" y="933120"/>
-            <a:ext cx="5399640" cy="3890520"/>
+            <a:ext cx="5399280" cy="3890160"/>
           </a:xfrm>
           <a:prstGeom prst="rect">
             <a:avLst/>
@@ -5270,7 +5270,7 @@
                 <a:latin typeface="Arial"/>
                 <a:ea typeface="Arial"/>
               </a:rPr>
-              <a:t>-Usuários enfrentam problemas em login para realizar o sorteio pois não conseguem realizar sorteios de coisas simples sem vincular o e-mail ou a conta do instagram.</a:t>
+              <a:t>-Usuários enfrentam problemas em login, e como consequencia não conseguem realizar sorteios de forma simples sem vincular a um e-mail ou a conta do instagram.</a:t>
             </a:r>
             <a:endParaRPr b="0" lang="pt-BR" sz="1800" spc="-1" strike="noStrike">
               <a:latin typeface="Arial"/>
@@ -5294,7 +5294,31 @@
                 <a:latin typeface="Arial"/>
                 <a:ea typeface="Arial"/>
               </a:rPr>
-              <a:t>-Dificuldade de realizar sorteios pois não localizam a conta no instagram ou gmail. Interface complicada de utilizar.</a:t>
+              <a:t>-Dificuldade de realizar sorteios pois não localizam a conta no instagram ou gmail. </a:t>
+            </a:r>
+            <a:endParaRPr b="0" lang="pt-BR" sz="1800" spc="-1" strike="noStrike">
+              <a:latin typeface="Arial"/>
+            </a:endParaRPr>
+          </a:p>
+          <a:p>
+            <a:pPr algn="just">
+              <a:lnSpc>
+                <a:spcPct val="138000"/>
+              </a:lnSpc>
+              <a:buNone/>
+              <a:tabLst>
+                <a:tab algn="l" pos="0"/>
+              </a:tabLst>
+            </a:pPr>
+            <a:r>
+              <a:rPr b="0" lang="pt-BR" sz="1800" spc="-1" strike="noStrike">
+                <a:solidFill>
+                  <a:srgbClr val="595959"/>
+                </a:solidFill>
+                <a:latin typeface="Arial"/>
+                <a:ea typeface="Arial"/>
+              </a:rPr>
+              <a:t>-Interface complicada de utilizar.</a:t>
             </a:r>
             <a:endParaRPr b="0" lang="pt-BR" sz="1800" spc="-1" strike="noStrike">
               <a:latin typeface="Arial"/>
@@ -5310,13 +5334,13 @@
         </p:nvPicPr>
         <p:blipFill>
           <a:blip r:embed="rId1"/>
-          <a:srcRect l="33970" t="0" r="23493" b="7199"/>
+          <a:srcRect l="33964" t="0" r="23493" b="7199"/>
           <a:stretch/>
         </p:blipFill>
         <p:spPr>
           <a:xfrm>
             <a:off x="6300000" y="356040"/>
-            <a:ext cx="2619360" cy="4503600"/>
+            <a:ext cx="2619000" cy="4503240"/>
           </a:xfrm>
           <a:prstGeom prst="rect">
             <a:avLst/>

</xml_diff>